<commit_message>
List of Subject Type
</commit_message>
<xml_diff>
--- a/RxSwiftBasics/day2/RxSwiftBasics2.pptx
+++ b/RxSwiftBasics/day2/RxSwiftBasics2.pptx
@@ -5,22 +5,23 @@
     <p:sldMasterId id="2147483657" r:id="rId1"/>
   </p:sldMasterIdLst>
   <p:notesMasterIdLst>
-    <p:notesMasterId r:id="rId15"/>
+    <p:notesMasterId r:id="rId16"/>
   </p:notesMasterIdLst>
   <p:sldIdLst>
     <p:sldId id="256" r:id="rId2"/>
     <p:sldId id="339" r:id="rId3"/>
     <p:sldId id="341" r:id="rId4"/>
     <p:sldId id="329" r:id="rId5"/>
-    <p:sldId id="330" r:id="rId6"/>
-    <p:sldId id="331" r:id="rId7"/>
-    <p:sldId id="332" r:id="rId8"/>
-    <p:sldId id="337" r:id="rId9"/>
-    <p:sldId id="333" r:id="rId10"/>
-    <p:sldId id="334" r:id="rId11"/>
-    <p:sldId id="335" r:id="rId12"/>
-    <p:sldId id="336" r:id="rId13"/>
-    <p:sldId id="338" r:id="rId14"/>
+    <p:sldId id="342" r:id="rId6"/>
+    <p:sldId id="330" r:id="rId7"/>
+    <p:sldId id="331" r:id="rId8"/>
+    <p:sldId id="332" r:id="rId9"/>
+    <p:sldId id="337" r:id="rId10"/>
+    <p:sldId id="333" r:id="rId11"/>
+    <p:sldId id="334" r:id="rId12"/>
+    <p:sldId id="335" r:id="rId13"/>
+    <p:sldId id="336" r:id="rId14"/>
+    <p:sldId id="338" r:id="rId15"/>
   </p:sldIdLst>
   <p:sldSz cx="9144000" cy="5143500" type="screen16x9"/>
   <p:notesSz cx="6858000" cy="9144000"/>
@@ -914,6 +915,107 @@
 </file>
 
 <file path=ppt/notesSlides/notesSlide13.xml><?xml version="1.0" encoding="utf-8"?>
+<p:notes xmlns:a="http://schemas.openxmlformats.org/drawingml/2006/main" xmlns:r="http://schemas.openxmlformats.org/officeDocument/2006/relationships" xmlns:p="http://schemas.openxmlformats.org/presentationml/2006/main" showMasterSp="0" showMasterPhAnim="0">
+  <p:cSld>
+    <p:spTree>
+      <p:nvGrpSpPr>
+        <p:cNvPr id="1" name="Shape 185"/>
+        <p:cNvGrpSpPr/>
+        <p:nvPr/>
+      </p:nvGrpSpPr>
+      <p:grpSpPr>
+        <a:xfrm>
+          <a:off x="0" y="0"/>
+          <a:ext cx="0" cy="0"/>
+          <a:chOff x="0" y="0"/>
+          <a:chExt cx="0" cy="0"/>
+        </a:xfrm>
+      </p:grpSpPr>
+      <p:sp>
+        <p:nvSpPr>
+          <p:cNvPr id="186" name="Shape 186"/>
+          <p:cNvSpPr>
+            <a:spLocks noGrp="1" noRot="1" noChangeAspect="1"/>
+          </p:cNvSpPr>
+          <p:nvPr>
+            <p:ph type="sldImg" idx="2"/>
+          </p:nvPr>
+        </p:nvSpPr>
+        <p:spPr>
+          <a:xfrm>
+            <a:off x="381000" y="685800"/>
+            <a:ext cx="6096000" cy="3429000"/>
+          </a:xfrm>
+          <a:custGeom>
+            <a:avLst/>
+            <a:gdLst/>
+            <a:ahLst/>
+            <a:cxnLst/>
+            <a:rect l="0" t="0" r="0" b="0"/>
+            <a:pathLst>
+              <a:path w="120000" h="120000" extrusionOk="0">
+                <a:moveTo>
+                  <a:pt x="0" y="0"/>
+                </a:moveTo>
+                <a:lnTo>
+                  <a:pt x="120000" y="0"/>
+                </a:lnTo>
+                <a:lnTo>
+                  <a:pt x="120000" y="120000"/>
+                </a:lnTo>
+                <a:lnTo>
+                  <a:pt x="0" y="120000"/>
+                </a:lnTo>
+                <a:close/>
+              </a:path>
+            </a:pathLst>
+          </a:custGeom>
+        </p:spPr>
+      </p:sp>
+      <p:sp>
+        <p:nvSpPr>
+          <p:cNvPr id="187" name="Shape 187"/>
+          <p:cNvSpPr txBox="1">
+            <a:spLocks noGrp="1"/>
+          </p:cNvSpPr>
+          <p:nvPr>
+            <p:ph type="body" idx="1"/>
+          </p:nvPr>
+        </p:nvSpPr>
+        <p:spPr>
+          <a:xfrm>
+            <a:off x="685800" y="4343400"/>
+            <a:ext cx="5486400" cy="4114800"/>
+          </a:xfrm>
+          <a:prstGeom prst="rect">
+            <a:avLst/>
+          </a:prstGeom>
+        </p:spPr>
+        <p:txBody>
+          <a:bodyPr wrap="square" lIns="91425" tIns="91425" rIns="91425" bIns="91425" anchor="t" anchorCtr="0">
+            <a:noAutofit/>
+          </a:bodyPr>
+          <a:lstStyle/>
+          <a:p>
+            <a:pPr lvl="0">
+              <a:spcBef>
+                <a:spcPts val="0"/>
+              </a:spcBef>
+              <a:buNone/>
+            </a:pPr>
+            <a:endParaRPr/>
+          </a:p>
+        </p:txBody>
+      </p:sp>
+    </p:spTree>
+  </p:cSld>
+  <p:clrMapOvr>
+    <a:masterClrMapping/>
+  </p:clrMapOvr>
+</p:notes>
+</file>
+
+<file path=ppt/notesSlides/notesSlide14.xml><?xml version="1.0" encoding="utf-8"?>
 <p:notes xmlns:a="http://schemas.openxmlformats.org/drawingml/2006/main" xmlns:r="http://schemas.openxmlformats.org/officeDocument/2006/relationships" xmlns:p="http://schemas.openxmlformats.org/presentationml/2006/main" showMasterSp="0" showMasterPhAnim="0">
   <p:cSld>
     <p:spTree>
@@ -4560,7 +4662,7 @@
             </a:r>
             <a:r>
               <a:rPr lang="en-US" dirty="0" smtClean="0"/>
-              <a:t> - 2</a:t>
+              <a:t> - 1</a:t>
             </a:r>
             <a:endParaRPr lang="en" dirty="0"/>
           </a:p>
@@ -4637,7 +4739,7 @@
       </p:pic>
       <p:pic>
         <p:nvPicPr>
-          <p:cNvPr id="4" name="Picture 3" descr="Screen Shot 2018-04-28 at 10.50.58 PM.png"/>
+          <p:cNvPr id="5" name="Picture 4" descr="Screen Shot 2018-04-28 at 10.49.25 PM.png"/>
           <p:cNvPicPr>
             <a:picLocks noChangeAspect="1"/>
           </p:cNvPicPr>
@@ -4657,8 +4759,8 @@
         </p:blipFill>
         <p:spPr>
           <a:xfrm>
-            <a:off x="1168477" y="1158776"/>
-            <a:ext cx="4197500" cy="3984724"/>
+            <a:off x="1414869" y="1158775"/>
+            <a:ext cx="3455543" cy="3953294"/>
           </a:xfrm>
           <a:prstGeom prst="rect">
             <a:avLst/>
@@ -4668,7 +4770,7 @@
     </p:spTree>
     <p:extLst>
       <p:ext uri="{BB962C8B-B14F-4D97-AF65-F5344CB8AC3E}">
-        <p14:creationId xmlns:p14="http://schemas.microsoft.com/office/powerpoint/2010/main" val="49246331"/>
+        <p14:creationId xmlns:p14="http://schemas.microsoft.com/office/powerpoint/2010/main" val="640576846"/>
       </p:ext>
     </p:extLst>
   </p:cSld>
@@ -4755,7 +4857,7 @@
             </a:r>
             <a:r>
               <a:rPr lang="en-US" dirty="0" smtClean="0"/>
-              <a:t> - 3</a:t>
+              <a:t> - 2</a:t>
             </a:r>
             <a:endParaRPr lang="en" dirty="0"/>
           </a:p>
@@ -4832,7 +4934,7 @@
       </p:pic>
       <p:pic>
         <p:nvPicPr>
-          <p:cNvPr id="3" name="Picture 2" descr="Screen Shot 2018-04-28 at 10.53.14 PM.png"/>
+          <p:cNvPr id="4" name="Picture 3" descr="Screen Shot 2018-04-28 at 10.50.58 PM.png"/>
           <p:cNvPicPr>
             <a:picLocks noChangeAspect="1"/>
           </p:cNvPicPr>
@@ -4852,8 +4954,8 @@
         </p:blipFill>
         <p:spPr>
           <a:xfrm>
-            <a:off x="1516530" y="1158775"/>
-            <a:ext cx="4304665" cy="3984724"/>
+            <a:off x="1168477" y="1158776"/>
+            <a:ext cx="4197500" cy="3984724"/>
           </a:xfrm>
           <a:prstGeom prst="rect">
             <a:avLst/>
@@ -4863,7 +4965,7 @@
     </p:spTree>
     <p:extLst>
       <p:ext uri="{BB962C8B-B14F-4D97-AF65-F5344CB8AC3E}">
-        <p14:creationId xmlns:p14="http://schemas.microsoft.com/office/powerpoint/2010/main" val="1139717155"/>
+        <p14:creationId xmlns:p14="http://schemas.microsoft.com/office/powerpoint/2010/main" val="49246331"/>
       </p:ext>
     </p:extLst>
   </p:cSld>
@@ -4950,7 +5052,7 @@
             </a:r>
             <a:r>
               <a:rPr lang="en-US" dirty="0" smtClean="0"/>
-              <a:t> - 4</a:t>
+              <a:t> - 3</a:t>
             </a:r>
             <a:endParaRPr lang="en" dirty="0"/>
           </a:p>
@@ -5027,7 +5129,7 @@
       </p:pic>
       <p:pic>
         <p:nvPicPr>
-          <p:cNvPr id="4" name="Picture 3" descr="Screen Shot 2018-04-28 at 10.54.12 PM.png"/>
+          <p:cNvPr id="3" name="Picture 2" descr="Screen Shot 2018-04-28 at 10.53.14 PM.png"/>
           <p:cNvPicPr>
             <a:picLocks noChangeAspect="1"/>
           </p:cNvPicPr>
@@ -5047,8 +5149,8 @@
         </p:blipFill>
         <p:spPr>
           <a:xfrm>
-            <a:off x="1215438" y="1158774"/>
-            <a:ext cx="4179577" cy="3984725"/>
+            <a:off x="1516530" y="1158775"/>
+            <a:ext cx="4304665" cy="3984724"/>
           </a:xfrm>
           <a:prstGeom prst="rect">
             <a:avLst/>
@@ -5058,7 +5160,7 @@
     </p:spTree>
     <p:extLst>
       <p:ext uri="{BB962C8B-B14F-4D97-AF65-F5344CB8AC3E}">
-        <p14:creationId xmlns:p14="http://schemas.microsoft.com/office/powerpoint/2010/main" val="1991800521"/>
+        <p14:creationId xmlns:p14="http://schemas.microsoft.com/office/powerpoint/2010/main" val="1139717155"/>
       </p:ext>
     </p:extLst>
   </p:cSld>
@@ -5124,8 +5226,28 @@
               <a:buNone/>
             </a:pPr>
             <a:r>
+              <a:rPr lang="en-US" dirty="0" err="1" smtClean="0"/>
+              <a:t>flatMap</a:t>
+            </a:r>
+            <a:r>
               <a:rPr lang="en-US" dirty="0" smtClean="0"/>
-              <a:t>Lab -2</a:t>
+              <a:t>, </a:t>
+            </a:r>
+            <a:r>
+              <a:rPr lang="en-US" dirty="0" err="1" smtClean="0"/>
+              <a:t>flatMapFirst</a:t>
+            </a:r>
+            <a:r>
+              <a:rPr lang="en-US" dirty="0" smtClean="0"/>
+              <a:t>, </a:t>
+            </a:r>
+            <a:r>
+              <a:rPr lang="en-US" dirty="0" err="1" smtClean="0"/>
+              <a:t>flatMapLatest</a:t>
+            </a:r>
+            <a:r>
+              <a:rPr lang="en-US" dirty="0" smtClean="0"/>
+              <a:t> - 4</a:t>
             </a:r>
             <a:endParaRPr lang="en" dirty="0"/>
           </a:p>
@@ -5165,6 +5287,181 @@
             <a:fld id="{00000000-1234-1234-1234-123412341234}" type="slidenum">
               <a:rPr lang="en"/>
               <a:t>13</a:t>
+            </a:fld>
+            <a:endParaRPr lang="en"/>
+          </a:p>
+        </p:txBody>
+      </p:sp>
+      <p:pic>
+        <p:nvPicPr>
+          <p:cNvPr id="2" name="Picture 1" descr="Rx_Logo_M.png"/>
+          <p:cNvPicPr>
+            <a:picLocks noChangeAspect="1"/>
+          </p:cNvPicPr>
+          <p:nvPr/>
+        </p:nvPicPr>
+        <p:blipFill>
+          <a:blip r:embed="rId3">
+            <a:extLst>
+              <a:ext uri="{28A0092B-C50C-407E-A947-70E740481C1C}">
+                <a14:useLocalDpi xmlns:a14="http://schemas.microsoft.com/office/drawing/2010/main" val="0"/>
+              </a:ext>
+            </a:extLst>
+          </a:blip>
+          <a:stretch>
+            <a:fillRect/>
+          </a:stretch>
+        </p:blipFill>
+        <p:spPr>
+          <a:xfrm>
+            <a:off x="151129" y="442005"/>
+            <a:ext cx="663146" cy="663146"/>
+          </a:xfrm>
+          <a:prstGeom prst="rect">
+            <a:avLst/>
+          </a:prstGeom>
+        </p:spPr>
+      </p:pic>
+      <p:pic>
+        <p:nvPicPr>
+          <p:cNvPr id="4" name="Picture 3" descr="Screen Shot 2018-04-28 at 10.54.12 PM.png"/>
+          <p:cNvPicPr>
+            <a:picLocks noChangeAspect="1"/>
+          </p:cNvPicPr>
+          <p:nvPr/>
+        </p:nvPicPr>
+        <p:blipFill>
+          <a:blip r:embed="rId4">
+            <a:extLst>
+              <a:ext uri="{28A0092B-C50C-407E-A947-70E740481C1C}">
+                <a14:useLocalDpi xmlns:a14="http://schemas.microsoft.com/office/drawing/2010/main" val="0"/>
+              </a:ext>
+            </a:extLst>
+          </a:blip>
+          <a:stretch>
+            <a:fillRect/>
+          </a:stretch>
+        </p:blipFill>
+        <p:spPr>
+          <a:xfrm>
+            <a:off x="1215438" y="1158774"/>
+            <a:ext cx="4179577" cy="3984725"/>
+          </a:xfrm>
+          <a:prstGeom prst="rect">
+            <a:avLst/>
+          </a:prstGeom>
+        </p:spPr>
+      </p:pic>
+    </p:spTree>
+    <p:extLst>
+      <p:ext uri="{BB962C8B-B14F-4D97-AF65-F5344CB8AC3E}">
+        <p14:creationId xmlns:p14="http://schemas.microsoft.com/office/powerpoint/2010/main" val="1991800521"/>
+      </p:ext>
+    </p:extLst>
+  </p:cSld>
+  <p:clrMapOvr>
+    <a:masterClrMapping/>
+  </p:clrMapOvr>
+  <p:timing>
+    <p:tnLst>
+      <p:par>
+        <p:cTn xmlns:p14="http://schemas.microsoft.com/office/powerpoint/2010/main" id="1" dur="indefinite" restart="never" nodeType="tmRoot"/>
+      </p:par>
+    </p:tnLst>
+  </p:timing>
+</p:sld>
+</file>
+
+<file path=ppt/slides/slide14.xml><?xml version="1.0" encoding="utf-8"?>
+<p:sld xmlns:a="http://schemas.openxmlformats.org/drawingml/2006/main" xmlns:r="http://schemas.openxmlformats.org/officeDocument/2006/relationships" xmlns:p="http://schemas.openxmlformats.org/presentationml/2006/main">
+  <p:cSld>
+    <p:spTree>
+      <p:nvGrpSpPr>
+        <p:cNvPr id="1" name="Shape 188"/>
+        <p:cNvGrpSpPr/>
+        <p:nvPr/>
+      </p:nvGrpSpPr>
+      <p:grpSpPr>
+        <a:xfrm>
+          <a:off x="0" y="0"/>
+          <a:ext cx="0" cy="0"/>
+          <a:chOff x="0" y="0"/>
+          <a:chExt cx="0" cy="0"/>
+        </a:xfrm>
+      </p:grpSpPr>
+      <p:sp>
+        <p:nvSpPr>
+          <p:cNvPr id="189" name="Shape 189"/>
+          <p:cNvSpPr txBox="1">
+            <a:spLocks noGrp="1"/>
+          </p:cNvSpPr>
+          <p:nvPr>
+            <p:ph type="title"/>
+          </p:nvPr>
+        </p:nvSpPr>
+        <p:spPr>
+          <a:xfrm>
+            <a:off x="814275" y="392575"/>
+            <a:ext cx="5258400" cy="766200"/>
+          </a:xfrm>
+          <a:prstGeom prst="rect">
+            <a:avLst/>
+          </a:prstGeom>
+        </p:spPr>
+        <p:txBody>
+          <a:bodyPr wrap="square" lIns="91425" tIns="91425" rIns="91425" bIns="91425" anchor="ctr" anchorCtr="0">
+            <a:noAutofit/>
+          </a:bodyPr>
+          <a:lstStyle/>
+          <a:p>
+            <a:pPr lvl="0" rtl="0">
+              <a:spcBef>
+                <a:spcPts val="0"/>
+              </a:spcBef>
+              <a:buNone/>
+            </a:pPr>
+            <a:r>
+              <a:rPr lang="en-US" dirty="0" smtClean="0"/>
+              <a:t>Lab -2</a:t>
+            </a:r>
+            <a:endParaRPr lang="en" dirty="0"/>
+          </a:p>
+        </p:txBody>
+      </p:sp>
+      <p:sp>
+        <p:nvSpPr>
+          <p:cNvPr id="192" name="Shape 192"/>
+          <p:cNvSpPr txBox="1">
+            <a:spLocks noGrp="1"/>
+          </p:cNvSpPr>
+          <p:nvPr>
+            <p:ph type="sldNum" idx="12"/>
+          </p:nvPr>
+        </p:nvSpPr>
+        <p:spPr>
+          <a:xfrm>
+            <a:off x="7618000" y="4636500"/>
+            <a:ext cx="1487400" cy="315600"/>
+          </a:xfrm>
+          <a:prstGeom prst="rect">
+            <a:avLst/>
+          </a:prstGeom>
+        </p:spPr>
+        <p:txBody>
+          <a:bodyPr wrap="square" lIns="91425" tIns="91425" rIns="91425" bIns="91425" anchor="ctr" anchorCtr="0">
+            <a:noAutofit/>
+          </a:bodyPr>
+          <a:lstStyle/>
+          <a:p>
+            <a:pPr lvl="0">
+              <a:spcBef>
+                <a:spcPts val="0"/>
+              </a:spcBef>
+              <a:buNone/>
+            </a:pPr>
+            <a:fld id="{00000000-1234-1234-1234-123412341234}" type="slidenum">
+              <a:rPr lang="en"/>
+              <a:t>14</a:t>
             </a:fld>
             <a:endParaRPr lang="en"/>
           </a:p>
@@ -6264,8 +6561,8 @@
               <a:buNone/>
             </a:pPr>
             <a:r>
-              <a:rPr lang="en-US" dirty="0" err="1" smtClean="0"/>
-              <a:t>PublishSubject</a:t>
+              <a:rPr lang="en-US" dirty="0" smtClean="0"/>
+              <a:t>Subject</a:t>
             </a:r>
             <a:endParaRPr lang="en" dirty="0"/>
           </a:p>
@@ -6340,70 +6637,167 @@
           </a:prstGeom>
         </p:spPr>
       </p:pic>
-      <p:pic>
-        <p:nvPicPr>
-          <p:cNvPr id="5" name="Picture 4" descr="Screen Shot 2018-04-27 at 11.43.00 PM.png"/>
-          <p:cNvPicPr>
-            <a:picLocks noChangeAspect="1"/>
-          </p:cNvPicPr>
-          <p:nvPr/>
-        </p:nvPicPr>
-        <p:blipFill>
-          <a:blip r:embed="rId4">
-            <a:extLst>
-              <a:ext uri="{28A0092B-C50C-407E-A947-70E740481C1C}">
-                <a14:useLocalDpi xmlns:a14="http://schemas.microsoft.com/office/drawing/2010/main" val="0"/>
-              </a:ext>
-            </a:extLst>
-          </a:blip>
-          <a:stretch>
-            <a:fillRect/>
-          </a:stretch>
-        </p:blipFill>
-        <p:spPr>
-          <a:xfrm>
-            <a:off x="205946" y="1324856"/>
-            <a:ext cx="3624649" cy="3818644"/>
+      <p:sp>
+        <p:nvSpPr>
+          <p:cNvPr id="7" name="Shape 237"/>
+          <p:cNvSpPr txBox="1">
+            <a:spLocks noGrp="1"/>
+          </p:cNvSpPr>
+          <p:nvPr>
+            <p:ph type="body" idx="1"/>
+          </p:nvPr>
+        </p:nvSpPr>
+        <p:spPr>
+          <a:xfrm>
+            <a:off x="814274" y="1323185"/>
+            <a:ext cx="6941095" cy="3376401"/>
           </a:xfrm>
           <a:prstGeom prst="rect">
             <a:avLst/>
           </a:prstGeom>
         </p:spPr>
-      </p:pic>
-      <p:pic>
-        <p:nvPicPr>
-          <p:cNvPr id="6" name="Picture 5" descr="Screen Shot 2018-04-27 at 11.43.30 PM.png"/>
-          <p:cNvPicPr>
-            <a:picLocks noChangeAspect="1"/>
-          </p:cNvPicPr>
-          <p:nvPr/>
-        </p:nvPicPr>
-        <p:blipFill>
-          <a:blip r:embed="rId5">
-            <a:extLst>
-              <a:ext uri="{28A0092B-C50C-407E-A947-70E740481C1C}">
-                <a14:useLocalDpi xmlns:a14="http://schemas.microsoft.com/office/drawing/2010/main" val="0"/>
-              </a:ext>
-            </a:extLst>
-          </a:blip>
-          <a:stretch>
-            <a:fillRect/>
-          </a:stretch>
-        </p:blipFill>
-        <p:spPr>
-          <a:xfrm>
-            <a:off x="5208591" y="1338280"/>
-            <a:ext cx="3159490" cy="3109656"/>
-          </a:xfrm>
-          <a:prstGeom prst="rect">
-            <a:avLst/>
-          </a:prstGeom>
-        </p:spPr>
-      </p:pic>
+        <p:txBody>
+          <a:bodyPr wrap="square" lIns="91425" tIns="91425" rIns="91425" bIns="91425" anchor="ctr" anchorCtr="0">
+            <a:noAutofit/>
+          </a:bodyPr>
+          <a:lstStyle/>
+          <a:p>
+            <a:pPr>
+              <a:buNone/>
+            </a:pPr>
+            <a:r>
+              <a:rPr lang="en-US" sz="1400" dirty="0">
+                <a:latin typeface="+mj-lt"/>
+              </a:rPr>
+              <a:t>• </a:t>
+            </a:r>
+            <a:r>
+              <a:rPr lang="en-US" sz="1400" b="1" dirty="0" err="1">
+                <a:latin typeface="+mj-lt"/>
+              </a:rPr>
+              <a:t>PublishSubject</a:t>
+            </a:r>
+            <a:r>
+              <a:rPr lang="en-US" sz="1400" dirty="0">
+                <a:latin typeface="+mj-lt"/>
+              </a:rPr>
+              <a:t>: Starts empty and only emits new elements to subscribers.</a:t>
+            </a:r>
+          </a:p>
+          <a:p>
+            <a:pPr>
+              <a:buNone/>
+            </a:pPr>
+            <a:endParaRPr lang="en-US" sz="1400" dirty="0">
+              <a:latin typeface="+mj-lt"/>
+            </a:endParaRPr>
+          </a:p>
+          <a:p>
+            <a:pPr>
+              <a:buNone/>
+            </a:pPr>
+            <a:r>
+              <a:rPr lang="en-US" sz="1400" dirty="0">
+                <a:latin typeface="+mj-lt"/>
+              </a:rPr>
+              <a:t>• </a:t>
+            </a:r>
+            <a:r>
+              <a:rPr lang="en-US" sz="1400" b="1" dirty="0" err="1">
+                <a:latin typeface="+mj-lt"/>
+              </a:rPr>
+              <a:t>BehaviorSubject</a:t>
+            </a:r>
+            <a:r>
+              <a:rPr lang="en-US" sz="1400" dirty="0">
+                <a:latin typeface="+mj-lt"/>
+              </a:rPr>
+              <a:t>: Starts with an initial value and replays it or the latest element to new subscribers.</a:t>
+            </a:r>
+          </a:p>
+          <a:p>
+            <a:pPr>
+              <a:buNone/>
+            </a:pPr>
+            <a:endParaRPr lang="en-US" sz="1400" dirty="0">
+              <a:latin typeface="+mj-lt"/>
+            </a:endParaRPr>
+          </a:p>
+          <a:p>
+            <a:pPr>
+              <a:buNone/>
+            </a:pPr>
+            <a:r>
+              <a:rPr lang="en-US" sz="1400" dirty="0">
+                <a:latin typeface="+mj-lt"/>
+              </a:rPr>
+              <a:t>• </a:t>
+            </a:r>
+            <a:r>
+              <a:rPr lang="en-US" sz="1400" b="1" dirty="0" err="1">
+                <a:latin typeface="+mj-lt"/>
+              </a:rPr>
+              <a:t>ReplaySubject</a:t>
+            </a:r>
+            <a:r>
+              <a:rPr lang="en-US" sz="1400" dirty="0">
+                <a:latin typeface="+mj-lt"/>
+              </a:rPr>
+              <a:t>: Initialized with a buffer size and will maintain a buffer of elements up to that size and replay it to new subscribers.</a:t>
+            </a:r>
+          </a:p>
+          <a:p>
+            <a:pPr>
+              <a:buNone/>
+            </a:pPr>
+            <a:endParaRPr lang="en-US" sz="1400" dirty="0">
+              <a:latin typeface="+mj-lt"/>
+            </a:endParaRPr>
+          </a:p>
+          <a:p>
+            <a:pPr>
+              <a:buNone/>
+            </a:pPr>
+            <a:r>
+              <a:rPr lang="en-US" sz="1400" dirty="0">
+                <a:latin typeface="+mj-lt"/>
+              </a:rPr>
+              <a:t>• </a:t>
+            </a:r>
+            <a:r>
+              <a:rPr lang="en-US" sz="1400" b="1" dirty="0">
+                <a:latin typeface="+mj-lt"/>
+              </a:rPr>
+              <a:t>Variable</a:t>
+            </a:r>
+            <a:r>
+              <a:rPr lang="en-US" sz="1400" dirty="0">
+                <a:latin typeface="+mj-lt"/>
+              </a:rPr>
+              <a:t>: Wraps a </a:t>
+            </a:r>
+            <a:r>
+              <a:rPr lang="en-US" sz="1400" dirty="0" err="1">
+                <a:latin typeface="+mj-lt"/>
+              </a:rPr>
+              <a:t>BehaviorSubject</a:t>
+            </a:r>
+            <a:r>
+              <a:rPr lang="en-US" sz="1400" dirty="0">
+                <a:latin typeface="+mj-lt"/>
+              </a:rPr>
+              <a:t>, preserves its current value as state, and replays only the latest/initial value to new subscribers.</a:t>
+            </a:r>
+            <a:endParaRPr lang="en-US" sz="1400" dirty="0">
+              <a:latin typeface="+mj-lt"/>
+            </a:endParaRPr>
+          </a:p>
+        </p:txBody>
+      </p:sp>
     </p:spTree>
     <p:extLst>
       <p:ext uri="{BB962C8B-B14F-4D97-AF65-F5344CB8AC3E}">
-        <p14:creationId xmlns:p14="http://schemas.microsoft.com/office/powerpoint/2010/main" val="600279464"/>
+        <p14:creationId xmlns:p14="http://schemas.microsoft.com/office/powerpoint/2010/main" val="1413227123"/>
       </p:ext>
     </p:extLst>
   </p:cSld>
@@ -6470,7 +6864,7 @@
             </a:pPr>
             <a:r>
               <a:rPr lang="en-US" dirty="0" err="1" smtClean="0"/>
-              <a:t>BehaviorSubject</a:t>
+              <a:t>PublishSubject</a:t>
             </a:r>
             <a:endParaRPr lang="en" dirty="0"/>
           </a:p>
@@ -6547,7 +6941,7 @@
       </p:pic>
       <p:pic>
         <p:nvPicPr>
-          <p:cNvPr id="3" name="Picture 2" descr="Screen Shot 2018-04-28 at 9.00.53 PM.png"/>
+          <p:cNvPr id="5" name="Picture 4" descr="Screen Shot 2018-04-27 at 11.43.00 PM.png"/>
           <p:cNvPicPr>
             <a:picLocks noChangeAspect="1"/>
           </p:cNvPicPr>
@@ -6567,8 +6961,38 @@
         </p:blipFill>
         <p:spPr>
           <a:xfrm>
-            <a:off x="558319" y="1341442"/>
-            <a:ext cx="4607662" cy="3802058"/>
+            <a:off x="205946" y="1324856"/>
+            <a:ext cx="3624649" cy="3818644"/>
+          </a:xfrm>
+          <a:prstGeom prst="rect">
+            <a:avLst/>
+          </a:prstGeom>
+        </p:spPr>
+      </p:pic>
+      <p:pic>
+        <p:nvPicPr>
+          <p:cNvPr id="6" name="Picture 5" descr="Screen Shot 2018-04-27 at 11.43.30 PM.png"/>
+          <p:cNvPicPr>
+            <a:picLocks noChangeAspect="1"/>
+          </p:cNvPicPr>
+          <p:nvPr/>
+        </p:nvPicPr>
+        <p:blipFill>
+          <a:blip r:embed="rId5">
+            <a:extLst>
+              <a:ext uri="{28A0092B-C50C-407E-A947-70E740481C1C}">
+                <a14:useLocalDpi xmlns:a14="http://schemas.microsoft.com/office/drawing/2010/main" val="0"/>
+              </a:ext>
+            </a:extLst>
+          </a:blip>
+          <a:stretch>
+            <a:fillRect/>
+          </a:stretch>
+        </p:blipFill>
+        <p:spPr>
+          <a:xfrm>
+            <a:off x="5208591" y="1338280"/>
+            <a:ext cx="3159490" cy="3109656"/>
           </a:xfrm>
           <a:prstGeom prst="rect">
             <a:avLst/>
@@ -6578,7 +7002,7 @@
     </p:spTree>
     <p:extLst>
       <p:ext uri="{BB962C8B-B14F-4D97-AF65-F5344CB8AC3E}">
-        <p14:creationId xmlns:p14="http://schemas.microsoft.com/office/powerpoint/2010/main" val="772912990"/>
+        <p14:creationId xmlns:p14="http://schemas.microsoft.com/office/powerpoint/2010/main" val="600279464"/>
       </p:ext>
     </p:extLst>
   </p:cSld>
@@ -6645,7 +7069,7 @@
             </a:pPr>
             <a:r>
               <a:rPr lang="en-US" dirty="0" err="1" smtClean="0"/>
-              <a:t>ReplaySubject</a:t>
+              <a:t>BehaviorSubject</a:t>
             </a:r>
             <a:endParaRPr lang="en" dirty="0"/>
           </a:p>
@@ -6722,7 +7146,7 @@
       </p:pic>
       <p:pic>
         <p:nvPicPr>
-          <p:cNvPr id="4" name="Picture 3" descr="Screen Shot 2018-04-28 at 9.19.04 PM.png"/>
+          <p:cNvPr id="3" name="Picture 2" descr="Screen Shot 2018-04-28 at 9.00.53 PM.png"/>
           <p:cNvPicPr>
             <a:picLocks noChangeAspect="1"/>
           </p:cNvPicPr>
@@ -6742,38 +7166,8 @@
         </p:blipFill>
         <p:spPr>
           <a:xfrm>
-            <a:off x="24543" y="1353629"/>
-            <a:ext cx="4948219" cy="3092637"/>
-          </a:xfrm>
-          <a:prstGeom prst="rect">
-            <a:avLst/>
-          </a:prstGeom>
-        </p:spPr>
-      </p:pic>
-      <p:pic>
-        <p:nvPicPr>
-          <p:cNvPr id="5" name="Picture 4" descr="Screen Shot 2018-04-28 at 9.19.14 PM.png"/>
-          <p:cNvPicPr>
-            <a:picLocks noChangeAspect="1"/>
-          </p:cNvPicPr>
-          <p:nvPr/>
-        </p:nvPicPr>
-        <p:blipFill>
-          <a:blip r:embed="rId5">
-            <a:extLst>
-              <a:ext uri="{28A0092B-C50C-407E-A947-70E740481C1C}">
-                <a14:useLocalDpi xmlns:a14="http://schemas.microsoft.com/office/drawing/2010/main" val="0"/>
-              </a:ext>
-            </a:extLst>
-          </a:blip>
-          <a:stretch>
-            <a:fillRect/>
-          </a:stretch>
-        </p:blipFill>
-        <p:spPr>
-          <a:xfrm>
-            <a:off x="5613861" y="1320938"/>
-            <a:ext cx="3178122" cy="3125329"/>
+            <a:off x="558319" y="1341442"/>
+            <a:ext cx="4607662" cy="3802058"/>
           </a:xfrm>
           <a:prstGeom prst="rect">
             <a:avLst/>
@@ -6783,7 +7177,7 @@
     </p:spTree>
     <p:extLst>
       <p:ext uri="{BB962C8B-B14F-4D97-AF65-F5344CB8AC3E}">
-        <p14:creationId xmlns:p14="http://schemas.microsoft.com/office/powerpoint/2010/main" val="3159587174"/>
+        <p14:creationId xmlns:p14="http://schemas.microsoft.com/office/powerpoint/2010/main" val="772912990"/>
       </p:ext>
     </p:extLst>
   </p:cSld>
@@ -6849,8 +7243,8 @@
               <a:buNone/>
             </a:pPr>
             <a:r>
-              <a:rPr lang="en-US" dirty="0" smtClean="0"/>
-              <a:t>Lab - 1</a:t>
+              <a:rPr lang="en-US" dirty="0" err="1" smtClean="0"/>
+              <a:t>ReplaySubject</a:t>
             </a:r>
             <a:endParaRPr lang="en" dirty="0"/>
           </a:p>
@@ -6925,56 +7319,70 @@
           </a:prstGeom>
         </p:spPr>
       </p:pic>
-      <p:sp>
-        <p:nvSpPr>
-          <p:cNvPr id="3" name="TextBox 2"/>
-          <p:cNvSpPr txBox="1"/>
+      <p:pic>
+        <p:nvPicPr>
+          <p:cNvPr id="4" name="Picture 3" descr="Screen Shot 2018-04-28 at 9.19.04 PM.png"/>
+          <p:cNvPicPr>
+            <a:picLocks noChangeAspect="1"/>
+          </p:cNvPicPr>
           <p:nvPr/>
-        </p:nvSpPr>
-        <p:spPr>
-          <a:xfrm>
-            <a:off x="998682" y="1720273"/>
-            <a:ext cx="4044697" cy="307777"/>
+        </p:nvPicPr>
+        <p:blipFill>
+          <a:blip r:embed="rId4">
+            <a:extLst>
+              <a:ext uri="{28A0092B-C50C-407E-A947-70E740481C1C}">
+                <a14:useLocalDpi xmlns:a14="http://schemas.microsoft.com/office/drawing/2010/main" val="0"/>
+              </a:ext>
+            </a:extLst>
+          </a:blip>
+          <a:stretch>
+            <a:fillRect/>
+          </a:stretch>
+        </p:blipFill>
+        <p:spPr>
+          <a:xfrm>
+            <a:off x="24543" y="1353629"/>
+            <a:ext cx="4948219" cy="3092637"/>
           </a:xfrm>
           <a:prstGeom prst="rect">
             <a:avLst/>
           </a:prstGeom>
-          <a:noFill/>
-        </p:spPr>
-        <p:txBody>
-          <a:bodyPr wrap="none" rtlCol="0">
-            <a:spAutoFit/>
-          </a:bodyPr>
-          <a:lstStyle/>
-          <a:p>
-            <a:r>
-              <a:rPr lang="en-US" dirty="0" err="1" smtClean="0"/>
-              <a:t>BehaviorSubject</a:t>
-            </a:r>
-            <a:r>
-              <a:rPr lang="en-US" dirty="0" smtClean="0"/>
-              <a:t>, </a:t>
-            </a:r>
-            <a:r>
-              <a:rPr lang="en-US" dirty="0" err="1" smtClean="0"/>
-              <a:t>PublishSubject</a:t>
-            </a:r>
-            <a:r>
-              <a:rPr lang="en-US" dirty="0" smtClean="0"/>
-              <a:t>, </a:t>
-            </a:r>
-            <a:r>
-              <a:rPr lang="en-US" dirty="0" err="1" smtClean="0"/>
-              <a:t>ReplaySubject</a:t>
-            </a:r>
-            <a:endParaRPr lang="en-US" dirty="0"/>
-          </a:p>
-        </p:txBody>
-      </p:sp>
+        </p:spPr>
+      </p:pic>
+      <p:pic>
+        <p:nvPicPr>
+          <p:cNvPr id="5" name="Picture 4" descr="Screen Shot 2018-04-28 at 9.19.14 PM.png"/>
+          <p:cNvPicPr>
+            <a:picLocks noChangeAspect="1"/>
+          </p:cNvPicPr>
+          <p:nvPr/>
+        </p:nvPicPr>
+        <p:blipFill>
+          <a:blip r:embed="rId5">
+            <a:extLst>
+              <a:ext uri="{28A0092B-C50C-407E-A947-70E740481C1C}">
+                <a14:useLocalDpi xmlns:a14="http://schemas.microsoft.com/office/drawing/2010/main" val="0"/>
+              </a:ext>
+            </a:extLst>
+          </a:blip>
+          <a:stretch>
+            <a:fillRect/>
+          </a:stretch>
+        </p:blipFill>
+        <p:spPr>
+          <a:xfrm>
+            <a:off x="5613861" y="1320938"/>
+            <a:ext cx="3178122" cy="3125329"/>
+          </a:xfrm>
+          <a:prstGeom prst="rect">
+            <a:avLst/>
+          </a:prstGeom>
+        </p:spPr>
+      </p:pic>
     </p:spTree>
     <p:extLst>
       <p:ext uri="{BB962C8B-B14F-4D97-AF65-F5344CB8AC3E}">
-        <p14:creationId xmlns:p14="http://schemas.microsoft.com/office/powerpoint/2010/main" val="1900758707"/>
+        <p14:creationId xmlns:p14="http://schemas.microsoft.com/office/powerpoint/2010/main" val="3159587174"/>
       </p:ext>
     </p:extLst>
   </p:cSld>
@@ -7040,28 +7448,8 @@
               <a:buNone/>
             </a:pPr>
             <a:r>
-              <a:rPr lang="en-US" dirty="0" err="1" smtClean="0"/>
-              <a:t>flatMap</a:t>
-            </a:r>
-            <a:r>
               <a:rPr lang="en-US" dirty="0" smtClean="0"/>
-              <a:t>, </a:t>
-            </a:r>
-            <a:r>
-              <a:rPr lang="en-US" dirty="0" err="1" smtClean="0"/>
-              <a:t>flatMapFirst</a:t>
-            </a:r>
-            <a:r>
-              <a:rPr lang="en-US" dirty="0" smtClean="0"/>
-              <a:t>, </a:t>
-            </a:r>
-            <a:r>
-              <a:rPr lang="en-US" dirty="0" err="1" smtClean="0"/>
-              <a:t>flatMapLatest</a:t>
-            </a:r>
-            <a:r>
-              <a:rPr lang="en-US" dirty="0" smtClean="0"/>
-              <a:t> - 1</a:t>
+              <a:t>Lab - 1</a:t>
             </a:r>
             <a:endParaRPr lang="en" dirty="0"/>
           </a:p>
@@ -7136,40 +7524,56 @@
           </a:prstGeom>
         </p:spPr>
       </p:pic>
-      <p:pic>
-        <p:nvPicPr>
-          <p:cNvPr id="5" name="Picture 4" descr="Screen Shot 2018-04-28 at 10.49.25 PM.png"/>
-          <p:cNvPicPr>
-            <a:picLocks noChangeAspect="1"/>
-          </p:cNvPicPr>
+      <p:sp>
+        <p:nvSpPr>
+          <p:cNvPr id="3" name="TextBox 2"/>
+          <p:cNvSpPr txBox="1"/>
           <p:nvPr/>
-        </p:nvPicPr>
-        <p:blipFill>
-          <a:blip r:embed="rId4">
-            <a:extLst>
-              <a:ext uri="{28A0092B-C50C-407E-A947-70E740481C1C}">
-                <a14:useLocalDpi xmlns:a14="http://schemas.microsoft.com/office/drawing/2010/main" val="0"/>
-              </a:ext>
-            </a:extLst>
-          </a:blip>
-          <a:stretch>
-            <a:fillRect/>
-          </a:stretch>
-        </p:blipFill>
-        <p:spPr>
-          <a:xfrm>
-            <a:off x="1414869" y="1158775"/>
-            <a:ext cx="3455543" cy="3953294"/>
+        </p:nvSpPr>
+        <p:spPr>
+          <a:xfrm>
+            <a:off x="998682" y="1720273"/>
+            <a:ext cx="4044697" cy="307777"/>
           </a:xfrm>
           <a:prstGeom prst="rect">
             <a:avLst/>
           </a:prstGeom>
-        </p:spPr>
-      </p:pic>
+          <a:noFill/>
+        </p:spPr>
+        <p:txBody>
+          <a:bodyPr wrap="none" rtlCol="0">
+            <a:spAutoFit/>
+          </a:bodyPr>
+          <a:lstStyle/>
+          <a:p>
+            <a:r>
+              <a:rPr lang="en-US" dirty="0" err="1" smtClean="0"/>
+              <a:t>BehaviorSubject</a:t>
+            </a:r>
+            <a:r>
+              <a:rPr lang="en-US" dirty="0" smtClean="0"/>
+              <a:t>, </a:t>
+            </a:r>
+            <a:r>
+              <a:rPr lang="en-US" dirty="0" err="1" smtClean="0"/>
+              <a:t>PublishSubject</a:t>
+            </a:r>
+            <a:r>
+              <a:rPr lang="en-US" dirty="0" smtClean="0"/>
+              <a:t>, </a:t>
+            </a:r>
+            <a:r>
+              <a:rPr lang="en-US" dirty="0" err="1" smtClean="0"/>
+              <a:t>ReplaySubject</a:t>
+            </a:r>
+            <a:endParaRPr lang="en-US" dirty="0"/>
+          </a:p>
+        </p:txBody>
+      </p:sp>
     </p:spTree>
     <p:extLst>
       <p:ext uri="{BB962C8B-B14F-4D97-AF65-F5344CB8AC3E}">
-        <p14:creationId xmlns:p14="http://schemas.microsoft.com/office/powerpoint/2010/main" val="640576846"/>
+        <p14:creationId xmlns:p14="http://schemas.microsoft.com/office/powerpoint/2010/main" val="1900758707"/>
       </p:ext>
     </p:extLst>
   </p:cSld>

</xml_diff>